<commit_message>
Add QR code example
</commit_message>
<xml_diff>
--- a/Mobile/Week 12/S1. User Testing and QR Code Reader.pptx
+++ b/Mobile/Week 12/S1. User Testing and QR Code Reader.pptx
@@ -5,7 +5,7 @@
     <p:sldMasterId id="2147483648" r:id="rId1"/>
   </p:sldMasterIdLst>
   <p:notesMasterIdLst>
-    <p:notesMasterId r:id="rId13"/>
+    <p:notesMasterId r:id="rId14"/>
   </p:notesMasterIdLst>
   <p:sldIdLst>
     <p:sldId id="256" r:id="rId2"/>
@@ -19,6 +19,7 @@
     <p:sldId id="274" r:id="rId10"/>
     <p:sldId id="275" r:id="rId11"/>
     <p:sldId id="276" r:id="rId12"/>
+    <p:sldId id="277" r:id="rId13"/>
   </p:sldIdLst>
   <p:sldSz cx="12192000" cy="6858000"/>
   <p:notesSz cx="6858000" cy="9144000"/>
@@ -737,6 +738,94 @@
     <p:extLst>
       <p:ext uri="{BB962C8B-B14F-4D97-AF65-F5344CB8AC3E}">
         <p14:creationId xmlns:p14="http://schemas.microsoft.com/office/powerpoint/2010/main" val="1008006413"/>
+      </p:ext>
+    </p:extLst>
+  </p:cSld>
+  <p:clrMapOvr>
+    <a:masterClrMapping/>
+  </p:clrMapOvr>
+</p:notes>
+</file>
+
+<file path=ppt/notesSlides/notesSlide12.xml><?xml version="1.0" encoding="utf-8"?>
+<p:notes xmlns:a="http://schemas.openxmlformats.org/drawingml/2006/main" xmlns:r="http://schemas.openxmlformats.org/officeDocument/2006/relationships" xmlns:p="http://schemas.openxmlformats.org/presentationml/2006/main">
+  <p:cSld>
+    <p:spTree>
+      <p:nvGrpSpPr>
+        <p:cNvPr id="1" name=""/>
+        <p:cNvGrpSpPr/>
+        <p:nvPr/>
+      </p:nvGrpSpPr>
+      <p:grpSpPr>
+        <a:xfrm>
+          <a:off x="0" y="0"/>
+          <a:ext cx="0" cy="0"/>
+          <a:chOff x="0" y="0"/>
+          <a:chExt cx="0" cy="0"/>
+        </a:xfrm>
+      </p:grpSpPr>
+      <p:sp>
+        <p:nvSpPr>
+          <p:cNvPr id="2" name="Slide Image Placeholder 1"/>
+          <p:cNvSpPr>
+            <a:spLocks noGrp="1" noRot="1" noChangeAspect="1"/>
+          </p:cNvSpPr>
+          <p:nvPr>
+            <p:ph type="sldImg"/>
+          </p:nvPr>
+        </p:nvSpPr>
+        <p:spPr/>
+      </p:sp>
+      <p:sp>
+        <p:nvSpPr>
+          <p:cNvPr id="3" name="Notes Placeholder 2"/>
+          <p:cNvSpPr>
+            <a:spLocks noGrp="1"/>
+          </p:cNvSpPr>
+          <p:nvPr>
+            <p:ph type="body" idx="1"/>
+          </p:nvPr>
+        </p:nvSpPr>
+        <p:spPr/>
+        <p:txBody>
+          <a:bodyPr/>
+          <a:lstStyle/>
+          <a:p>
+            <a:pPr marL="171450" indent="-171450">
+              <a:buFont typeface="Arial" charset="0"/>
+              <a:buChar char="•"/>
+            </a:pPr>
+            <a:endParaRPr lang="en-AU" baseline="0" dirty="0" smtClean="0"/>
+          </a:p>
+        </p:txBody>
+      </p:sp>
+      <p:sp>
+        <p:nvSpPr>
+          <p:cNvPr id="4" name="Slide Number Placeholder 3"/>
+          <p:cNvSpPr>
+            <a:spLocks noGrp="1"/>
+          </p:cNvSpPr>
+          <p:nvPr>
+            <p:ph type="sldNum" sz="quarter" idx="10"/>
+          </p:nvPr>
+        </p:nvSpPr>
+        <p:spPr/>
+        <p:txBody>
+          <a:bodyPr/>
+          <a:lstStyle/>
+          <a:p>
+            <a:fld id="{5C949890-84D1-B346-997E-B43A2CF20212}" type="slidenum">
+              <a:rPr lang="en-US" smtClean="0"/>
+              <a:t>12</a:t>
+            </a:fld>
+            <a:endParaRPr lang="en-US"/>
+          </a:p>
+        </p:txBody>
+      </p:sp>
+    </p:spTree>
+    <p:extLst>
+      <p:ext uri="{BB962C8B-B14F-4D97-AF65-F5344CB8AC3E}">
+        <p14:creationId xmlns:p14="http://schemas.microsoft.com/office/powerpoint/2010/main" val="790910705"/>
       </p:ext>
     </p:extLst>
   </p:cSld>
@@ -4780,7 +4869,6 @@
               <a:rPr lang="en-US" sz="3800" b="1" dirty="0" smtClean="0"/>
               <a:t>QR Reader</a:t>
             </a:r>
-            <a:endParaRPr lang="en-US" sz="3800" b="1" dirty="0" smtClean="0"/>
           </a:p>
           <a:p>
             <a:pPr marL="1485900" lvl="2" indent="-571500">
@@ -4948,7 +5036,15 @@
             </a:r>
             <a:r>
               <a:rPr lang="en-NZ" sz="2800" dirty="0"/>
-              <a:t>your app display, for each code read, the total count of each month read so </a:t>
+              <a:t>your app display, for each code read</a:t>
+            </a:r>
+            <a:r>
+              <a:rPr lang="en-NZ" sz="2800" dirty="0" smtClean="0"/>
+              <a:t>, the </a:t>
+            </a:r>
+            <a:r>
+              <a:rPr lang="en-NZ" sz="2800" dirty="0"/>
+              <a:t>total count of each month read so </a:t>
             </a:r>
             <a:r>
               <a:rPr lang="en-NZ" sz="2800" dirty="0" smtClean="0"/>
@@ -5011,6 +5107,171 @@
     <p:extLst>
       <p:ext uri="{BB962C8B-B14F-4D97-AF65-F5344CB8AC3E}">
         <p14:creationId xmlns:p14="http://schemas.microsoft.com/office/powerpoint/2010/main" val="941748229"/>
+      </p:ext>
+    </p:extLst>
+  </p:cSld>
+  <p:clrMapOvr>
+    <a:masterClrMapping/>
+  </p:clrMapOvr>
+  <p:timing>
+    <p:tnLst>
+      <p:par>
+        <p:cTn id="1" dur="indefinite" restart="never" nodeType="tmRoot"/>
+      </p:par>
+    </p:tnLst>
+  </p:timing>
+</p:sld>
+</file>
+
+<file path=ppt/slides/slide12.xml><?xml version="1.0" encoding="utf-8"?>
+<p:sld xmlns:a="http://schemas.openxmlformats.org/drawingml/2006/main" xmlns:r="http://schemas.openxmlformats.org/officeDocument/2006/relationships" xmlns:p="http://schemas.openxmlformats.org/presentationml/2006/main">
+  <p:cSld>
+    <p:bg>
+      <p:bgPr>
+        <a:solidFill>
+          <a:schemeClr val="accent5">
+            <a:lumMod val="60000"/>
+            <a:lumOff val="40000"/>
+          </a:schemeClr>
+        </a:solidFill>
+        <a:effectLst/>
+      </p:bgPr>
+    </p:bg>
+    <p:spTree>
+      <p:nvGrpSpPr>
+        <p:cNvPr id="1" name=""/>
+        <p:cNvGrpSpPr/>
+        <p:nvPr/>
+      </p:nvGrpSpPr>
+      <p:grpSpPr>
+        <a:xfrm>
+          <a:off x="0" y="0"/>
+          <a:ext cx="0" cy="0"/>
+          <a:chOff x="0" y="0"/>
+          <a:chExt cx="0" cy="0"/>
+        </a:xfrm>
+      </p:grpSpPr>
+      <p:sp>
+        <p:nvSpPr>
+          <p:cNvPr id="2" name="Rectangle 1"/>
+          <p:cNvSpPr/>
+          <p:nvPr/>
+        </p:nvSpPr>
+        <p:spPr>
+          <a:xfrm>
+            <a:off x="0" y="1299607"/>
+            <a:ext cx="12192000" cy="677108"/>
+          </a:xfrm>
+          <a:prstGeom prst="rect">
+            <a:avLst/>
+          </a:prstGeom>
+          <a:noFill/>
+        </p:spPr>
+        <p:txBody>
+          <a:bodyPr wrap="square" lIns="91440" tIns="45720" rIns="91440" bIns="45720">
+            <a:spAutoFit/>
+          </a:bodyPr>
+          <a:lstStyle/>
+          <a:p>
+            <a:r>
+              <a:rPr lang="en-US" sz="3800" dirty="0" smtClean="0"/>
+              <a:t>	</a:t>
+            </a:r>
+            <a:r>
+              <a:rPr lang="en-US" sz="3800" b="1" dirty="0" smtClean="0"/>
+              <a:t>Practical example</a:t>
+            </a:r>
+            <a:endParaRPr lang="en-US" sz="3800" b="1" dirty="0" smtClean="0"/>
+          </a:p>
+        </p:txBody>
+      </p:sp>
+      <p:sp>
+        <p:nvSpPr>
+          <p:cNvPr id="9" name="Slide Number Placeholder 8"/>
+          <p:cNvSpPr>
+            <a:spLocks noGrp="1"/>
+          </p:cNvSpPr>
+          <p:nvPr>
+            <p:ph type="sldNum" sz="quarter" idx="12"/>
+          </p:nvPr>
+        </p:nvSpPr>
+        <p:spPr/>
+        <p:txBody>
+          <a:bodyPr/>
+          <a:lstStyle/>
+          <a:p>
+            <a:fld id="{B822FDE6-25CA-0444-94EE-C6FC8C5EFEB8}" type="slidenum">
+              <a:rPr lang="en-US" smtClean="0"/>
+              <a:t>12</a:t>
+            </a:fld>
+            <a:endParaRPr lang="en-US"/>
+          </a:p>
+        </p:txBody>
+      </p:sp>
+      <p:pic>
+        <p:nvPicPr>
+          <p:cNvPr id="3" name="Picture 2"/>
+          <p:cNvPicPr>
+            <a:picLocks noChangeAspect="1"/>
+          </p:cNvPicPr>
+          <p:nvPr/>
+        </p:nvPicPr>
+        <p:blipFill>
+          <a:blip r:embed="rId3">
+            <a:extLst>
+              <a:ext uri="{28A0092B-C50C-407E-A947-70E740481C1C}">
+                <a14:useLocalDpi xmlns:a14="http://schemas.microsoft.com/office/drawing/2010/main" val="0"/>
+              </a:ext>
+            </a:extLst>
+          </a:blip>
+          <a:stretch>
+            <a:fillRect/>
+          </a:stretch>
+        </p:blipFill>
+        <p:spPr>
+          <a:xfrm>
+            <a:off x="8558587" y="1299607"/>
+            <a:ext cx="2848749" cy="5064442"/>
+          </a:xfrm>
+          <a:prstGeom prst="rect">
+            <a:avLst/>
+          </a:prstGeom>
+        </p:spPr>
+      </p:pic>
+      <p:pic>
+        <p:nvPicPr>
+          <p:cNvPr id="4" name="Picture 3"/>
+          <p:cNvPicPr>
+            <a:picLocks noChangeAspect="1"/>
+          </p:cNvPicPr>
+          <p:nvPr/>
+        </p:nvPicPr>
+        <p:blipFill>
+          <a:blip r:embed="rId4">
+            <a:extLst>
+              <a:ext uri="{28A0092B-C50C-407E-A947-70E740481C1C}">
+                <a14:useLocalDpi xmlns:a14="http://schemas.microsoft.com/office/drawing/2010/main" val="0"/>
+              </a:ext>
+            </a:extLst>
+          </a:blip>
+          <a:stretch>
+            <a:fillRect/>
+          </a:stretch>
+        </p:blipFill>
+        <p:spPr>
+          <a:xfrm>
+            <a:off x="5382375" y="1291908"/>
+            <a:ext cx="2848749" cy="5064442"/>
+          </a:xfrm>
+          <a:prstGeom prst="rect">
+            <a:avLst/>
+          </a:prstGeom>
+        </p:spPr>
+      </p:pic>
+    </p:spTree>
+    <p:extLst>
+      <p:ext uri="{BB962C8B-B14F-4D97-AF65-F5344CB8AC3E}">
+        <p14:creationId xmlns:p14="http://schemas.microsoft.com/office/powerpoint/2010/main" val="642618324"/>
       </p:ext>
     </p:extLst>
   </p:cSld>

</xml_diff>

<commit_message>
Add example files and update fp in Python I
</commit_message>
<xml_diff>
--- a/Mobile/Week 12/S1. User Testing and QR Code Reader.pptx
+++ b/Mobile/Week 12/S1. User Testing and QR Code Reader.pptx
@@ -219,7 +219,7 @@
           <a:p>
             <a:fld id="{5C15C721-1CBE-9B49-BE99-3A9DF18FA391}" type="datetimeFigureOut">
               <a:rPr lang="en-US" smtClean="0"/>
-              <a:t>5/20/19</a:t>
+              <a:t>5/22/19</a:t>
             </a:fld>
             <a:endParaRPr lang="en-US"/>
           </a:p>
@@ -1909,7 +1909,7 @@
           <a:p>
             <a:fld id="{E8A5E417-14EE-2444-894C-A3656C1DB430}" type="datetime1">
               <a:rPr lang="en-NZ" smtClean="0"/>
-              <a:t>20/05/19</a:t>
+              <a:t>22/05/19</a:t>
             </a:fld>
             <a:endParaRPr lang="en-US"/>
           </a:p>
@@ -2083,7 +2083,7 @@
           <a:p>
             <a:fld id="{B90ADCA0-A4A6-9D48-84F5-7232635DF6BA}" type="datetime1">
               <a:rPr lang="en-NZ" smtClean="0"/>
-              <a:t>20/05/19</a:t>
+              <a:t>22/05/19</a:t>
             </a:fld>
             <a:endParaRPr lang="en-US"/>
           </a:p>
@@ -2267,7 +2267,7 @@
           <a:p>
             <a:fld id="{08EB096E-6853-A041-AFF2-595173A2A13C}" type="datetime1">
               <a:rPr lang="en-NZ" smtClean="0"/>
-              <a:t>20/05/19</a:t>
+              <a:t>22/05/19</a:t>
             </a:fld>
             <a:endParaRPr lang="en-US"/>
           </a:p>
@@ -2441,7 +2441,7 @@
           <a:p>
             <a:fld id="{59AA4933-5F59-8E48-ABB7-AE1E0E83106D}" type="datetime1">
               <a:rPr lang="en-NZ" smtClean="0"/>
-              <a:t>20/05/19</a:t>
+              <a:t>22/05/19</a:t>
             </a:fld>
             <a:endParaRPr lang="en-US"/>
           </a:p>
@@ -2691,7 +2691,7 @@
           <a:p>
             <a:fld id="{302B46A8-9728-3346-9A90-F502A2199D87}" type="datetime1">
               <a:rPr lang="en-NZ" smtClean="0"/>
-              <a:t>20/05/19</a:t>
+              <a:t>22/05/19</a:t>
             </a:fld>
             <a:endParaRPr lang="en-US"/>
           </a:p>
@@ -2927,7 +2927,7 @@
           <a:p>
             <a:fld id="{00B24E1B-3B51-7E47-A05F-0C8BB03B7204}" type="datetime1">
               <a:rPr lang="en-NZ" smtClean="0"/>
-              <a:t>20/05/19</a:t>
+              <a:t>22/05/19</a:t>
             </a:fld>
             <a:endParaRPr lang="en-US"/>
           </a:p>
@@ -3298,7 +3298,7 @@
           <a:p>
             <a:fld id="{677A91FB-B7F0-4A45-917B-20518036F792}" type="datetime1">
               <a:rPr lang="en-NZ" smtClean="0"/>
-              <a:t>20/05/19</a:t>
+              <a:t>22/05/19</a:t>
             </a:fld>
             <a:endParaRPr lang="en-US"/>
           </a:p>
@@ -3420,7 +3420,7 @@
           <a:p>
             <a:fld id="{90DDF5F9-E45B-F849-BC81-293D772189B3}" type="datetime1">
               <a:rPr lang="en-NZ" smtClean="0"/>
-              <a:t>20/05/19</a:t>
+              <a:t>22/05/19</a:t>
             </a:fld>
             <a:endParaRPr lang="en-US"/>
           </a:p>
@@ -3519,7 +3519,7 @@
           <a:p>
             <a:fld id="{A6294DC3-2A75-6E46-8F13-7941D2778A5A}" type="datetime1">
               <a:rPr lang="en-NZ" smtClean="0"/>
-              <a:t>20/05/19</a:t>
+              <a:t>22/05/19</a:t>
             </a:fld>
             <a:endParaRPr lang="en-US"/>
           </a:p>
@@ -3800,7 +3800,7 @@
           <a:p>
             <a:fld id="{DEC1ADC0-A7E8-BA40-B736-C313CC296068}" type="datetime1">
               <a:rPr lang="en-NZ" smtClean="0"/>
-              <a:t>20/05/19</a:t>
+              <a:t>22/05/19</a:t>
             </a:fld>
             <a:endParaRPr lang="en-US"/>
           </a:p>
@@ -4057,7 +4057,7 @@
           <a:p>
             <a:fld id="{9D668796-7DD7-B340-8B58-B4287FE413F1}" type="datetime1">
               <a:rPr lang="en-NZ" smtClean="0"/>
-              <a:t>20/05/19</a:t>
+              <a:t>22/05/19</a:t>
             </a:fld>
             <a:endParaRPr lang="en-US"/>
           </a:p>
@@ -4274,7 +4274,7 @@
           <a:p>
             <a:fld id="{E4A3E60C-C878-7649-BC5D-2A913AF0ED9E}" type="datetime1">
               <a:rPr lang="en-NZ" smtClean="0"/>
-              <a:t>20/05/19</a:t>
+              <a:t>22/05/19</a:t>
             </a:fld>
             <a:endParaRPr lang="en-US"/>
           </a:p>
@@ -5000,7 +5000,7 @@
         <p:spPr>
           <a:xfrm>
             <a:off x="0" y="1299607"/>
-            <a:ext cx="12192000" cy="2785378"/>
+            <a:ext cx="12192000" cy="3216265"/>
           </a:xfrm>
           <a:prstGeom prst="rect">
             <a:avLst/>
@@ -5075,6 +5075,24 @@
             <a:r>
               <a:rPr lang="en-NZ" sz="2800" dirty="0" smtClean="0"/>
               <a:t>page</a:t>
+            </a:r>
+          </a:p>
+          <a:p>
+            <a:pPr marL="1943100" lvl="3" indent="-571500">
+              <a:buFont typeface="Arial" charset="0"/>
+              <a:buChar char="•"/>
+            </a:pPr>
+            <a:r>
+              <a:rPr lang="en-NZ" sz="2800" dirty="0" smtClean="0"/>
+              <a:t>I have provide a collection of QR codes ”</a:t>
+            </a:r>
+            <a:r>
+              <a:rPr lang="en-NZ" sz="2800" dirty="0" err="1" smtClean="0"/>
+              <a:t>qr</a:t>
+            </a:r>
+            <a:r>
+              <a:rPr lang="en-NZ" sz="2800" dirty="0" smtClean="0"/>
+              <a:t>-codes”</a:t>
             </a:r>
             <a:endParaRPr lang="en-NZ" sz="2800" dirty="0"/>
           </a:p>
@@ -5181,7 +5199,6 @@
               <a:rPr lang="en-US" sz="3800" b="1" dirty="0" smtClean="0"/>
               <a:t>Practical example</a:t>
             </a:r>
-            <a:endParaRPr lang="en-US" sz="3800" b="1" dirty="0" smtClean="0"/>
           </a:p>
         </p:txBody>
       </p:sp>
@@ -6485,7 +6502,19 @@
             </a:r>
             <a:r>
               <a:rPr lang="en-US" sz="2500" dirty="0" smtClean="0"/>
-              <a:t> Prompt the saying “No traffic incidents were found.”</a:t>
+              <a:t> </a:t>
+            </a:r>
+            <a:r>
+              <a:rPr lang="en-US" sz="2500" smtClean="0"/>
+              <a:t>Prompt </a:t>
+            </a:r>
+            <a:r>
+              <a:rPr lang="en-US" sz="2500" smtClean="0"/>
+              <a:t>the user </a:t>
+            </a:r>
+            <a:r>
+              <a:rPr lang="en-US" sz="2500" dirty="0" smtClean="0"/>
+              <a:t>saying “No traffic incidents were found.”</a:t>
             </a:r>
           </a:p>
         </p:txBody>

</xml_diff>